<commit_message>
fix dom manip ppt typo
</commit_message>
<xml_diff>
--- a/DomManipulation/DomManipulationIntro.pptx
+++ b/DomManipulation/DomManipulationIntro.pptx
@@ -218,7 +218,7 @@
           <a:p>
             <a:fld id="{19104133-B5B0-4351-8158-4F0E5EB1E2BF}" type="datetimeFigureOut">
               <a:rPr lang="en-US" smtClean="0"/>
-              <a:t>9/6/2022</a:t>
+              <a:t>4/1/2024</a:t>
             </a:fld>
             <a:endParaRPr lang="en-US"/>
           </a:p>
@@ -1449,7 +1449,7 @@
             <a:fld id="{1C2D31DE-C454-491C-B5C3-F097855E3DF7}" type="datetime4">
               <a:rPr lang="en-US" smtClean="0"/>
               <a:pPr/>
-              <a:t>September 6, 2022</a:t>
+              <a:t>April 1, 2024</a:t>
             </a:fld>
             <a:endParaRPr lang="en-US" dirty="0"/>
           </a:p>
@@ -4841,7 +4841,7 @@
           <a:p>
             <a:fld id="{5958763E-B898-436D-883D-03711491D54A}" type="datetimeFigureOut">
               <a:rPr lang="en-US" smtClean="0"/>
-              <a:t>9/6/2022</a:t>
+              <a:t>4/1/2024</a:t>
             </a:fld>
             <a:endParaRPr lang="en-US"/>
           </a:p>
@@ -5034,7 +5034,7 @@
           <a:p>
             <a:fld id="{5958763E-B898-436D-883D-03711491D54A}" type="datetimeFigureOut">
               <a:rPr lang="en-US" smtClean="0"/>
-              <a:t>9/6/2022</a:t>
+              <a:t>4/1/2024</a:t>
             </a:fld>
             <a:endParaRPr lang="en-US"/>
           </a:p>
@@ -5284,7 +5284,7 @@
           <a:p>
             <a:fld id="{5958763E-B898-436D-883D-03711491D54A}" type="datetimeFigureOut">
               <a:rPr lang="en-US" smtClean="0"/>
-              <a:t>9/6/2022</a:t>
+              <a:t>4/1/2024</a:t>
             </a:fld>
             <a:endParaRPr lang="en-US"/>
           </a:p>
@@ -5632,7 +5632,7 @@
           <a:p>
             <a:fld id="{5958763E-B898-436D-883D-03711491D54A}" type="datetimeFigureOut">
               <a:rPr lang="en-US" smtClean="0"/>
-              <a:t>9/6/2022</a:t>
+              <a:t>4/1/2024</a:t>
             </a:fld>
             <a:endParaRPr lang="en-US"/>
           </a:p>
@@ -6048,7 +6048,7 @@
           <a:p>
             <a:fld id="{5958763E-B898-436D-883D-03711491D54A}" type="datetimeFigureOut">
               <a:rPr lang="en-US" smtClean="0"/>
-              <a:t>9/6/2022</a:t>
+              <a:t>4/1/2024</a:t>
             </a:fld>
             <a:endParaRPr lang="en-US"/>
           </a:p>
@@ -6549,7 +6549,7 @@
           <a:p>
             <a:fld id="{5958763E-B898-436D-883D-03711491D54A}" type="datetimeFigureOut">
               <a:rPr lang="en-US" smtClean="0"/>
-              <a:t>9/6/2022</a:t>
+              <a:t>4/1/2024</a:t>
             </a:fld>
             <a:endParaRPr lang="en-US"/>
           </a:p>
@@ -7000,7 +7000,7 @@
           <a:p>
             <a:fld id="{5958763E-B898-436D-883D-03711491D54A}" type="datetimeFigureOut">
               <a:rPr lang="en-US" smtClean="0"/>
-              <a:t>9/6/2022</a:t>
+              <a:t>4/1/2024</a:t>
             </a:fld>
             <a:endParaRPr lang="en-US"/>
           </a:p>
@@ -7611,7 +7611,7 @@
           <a:p>
             <a:fld id="{5958763E-B898-436D-883D-03711491D54A}" type="datetimeFigureOut">
               <a:rPr lang="en-US" smtClean="0"/>
-              <a:t>9/6/2022</a:t>
+              <a:t>4/1/2024</a:t>
             </a:fld>
             <a:endParaRPr lang="en-US"/>
           </a:p>
@@ -8382,7 +8382,7 @@
           <a:p>
             <a:fld id="{5958763E-B898-436D-883D-03711491D54A}" type="datetimeFigureOut">
               <a:rPr lang="en-US" smtClean="0"/>
-              <a:t>9/6/2022</a:t>
+              <a:t>4/1/2024</a:t>
             </a:fld>
             <a:endParaRPr lang="en-US"/>
           </a:p>
@@ -8486,7 +8486,7 @@
           <a:p>
             <a:fld id="{5958763E-B898-436D-883D-03711491D54A}" type="datetimeFigureOut">
               <a:rPr lang="en-US" smtClean="0"/>
-              <a:t>9/6/2022</a:t>
+              <a:t>4/1/2024</a:t>
             </a:fld>
             <a:endParaRPr lang="en-US"/>
           </a:p>
@@ -8813,7 +8813,7 @@
             <a:fld id="{1C2D31DE-C454-491C-B5C3-F097855E3DF7}" type="datetime4">
               <a:rPr lang="en-US" smtClean="0"/>
               <a:pPr/>
-              <a:t>September 6, 2022</a:t>
+              <a:t>April 1, 2024</a:t>
             </a:fld>
             <a:endParaRPr lang="en-US" dirty="0"/>
           </a:p>
@@ -11965,7 +11965,7 @@
           <a:p>
             <a:fld id="{5958763E-B898-436D-883D-03711491D54A}" type="datetimeFigureOut">
               <a:rPr lang="en-US" smtClean="0"/>
-              <a:t>9/6/2022</a:t>
+              <a:t>4/1/2024</a:t>
             </a:fld>
             <a:endParaRPr lang="en-US"/>
           </a:p>
@@ -12089,7 +12089,7 @@
           <a:p>
             <a:fld id="{5958763E-B898-436D-883D-03711491D54A}" type="datetimeFigureOut">
               <a:rPr lang="en-US" smtClean="0"/>
-              <a:t>9/6/2022</a:t>
+              <a:t>4/1/2024</a:t>
             </a:fld>
             <a:endParaRPr lang="en-US"/>
           </a:p>
@@ -12213,7 +12213,7 @@
           <a:p>
             <a:fld id="{5958763E-B898-436D-883D-03711491D54A}" type="datetimeFigureOut">
               <a:rPr lang="en-US" smtClean="0"/>
-              <a:t>9/6/2022</a:t>
+              <a:t>4/1/2024</a:t>
             </a:fld>
             <a:endParaRPr lang="en-US"/>
           </a:p>
@@ -12337,7 +12337,7 @@
           <a:p>
             <a:fld id="{5958763E-B898-436D-883D-03711491D54A}" type="datetimeFigureOut">
               <a:rPr lang="en-US" smtClean="0"/>
-              <a:t>9/6/2022</a:t>
+              <a:t>4/1/2024</a:t>
             </a:fld>
             <a:endParaRPr lang="en-US"/>
           </a:p>
@@ -12461,7 +12461,7 @@
           <a:p>
             <a:fld id="{5958763E-B898-436D-883D-03711491D54A}" type="datetimeFigureOut">
               <a:rPr lang="en-US" smtClean="0"/>
-              <a:t>9/6/2022</a:t>
+              <a:t>4/1/2024</a:t>
             </a:fld>
             <a:endParaRPr lang="en-US"/>
           </a:p>
@@ -12585,7 +12585,7 @@
           <a:p>
             <a:fld id="{5958763E-B898-436D-883D-03711491D54A}" type="datetimeFigureOut">
               <a:rPr lang="en-US" smtClean="0"/>
-              <a:t>9/6/2022</a:t>
+              <a:t>4/1/2024</a:t>
             </a:fld>
             <a:endParaRPr lang="en-US"/>
           </a:p>
@@ -12709,7 +12709,7 @@
           <a:p>
             <a:fld id="{5958763E-B898-436D-883D-03711491D54A}" type="datetimeFigureOut">
               <a:rPr lang="en-US" smtClean="0"/>
-              <a:t>9/6/2022</a:t>
+              <a:t>4/1/2024</a:t>
             </a:fld>
             <a:endParaRPr lang="en-US"/>
           </a:p>
@@ -12833,7 +12833,7 @@
           <a:p>
             <a:fld id="{5958763E-B898-436D-883D-03711491D54A}" type="datetimeFigureOut">
               <a:rPr lang="en-US" smtClean="0"/>
-              <a:t>9/6/2022</a:t>
+              <a:t>4/1/2024</a:t>
             </a:fld>
             <a:endParaRPr lang="en-US"/>
           </a:p>
@@ -12966,7 +12966,7 @@
           <a:p>
             <a:fld id="{5958763E-B898-436D-883D-03711491D54A}" type="datetimeFigureOut">
               <a:rPr lang="en-US" smtClean="0"/>
-              <a:t>9/6/2022</a:t>
+              <a:t>4/1/2024</a:t>
             </a:fld>
             <a:endParaRPr lang="en-US"/>
           </a:p>
@@ -16305,7 +16305,7 @@
             <a:fld id="{1C2D31DE-C454-491C-B5C3-F097855E3DF7}" type="datetime4">
               <a:rPr lang="en-US" smtClean="0"/>
               <a:pPr/>
-              <a:t>September 6, 2022</a:t>
+              <a:t>April 1, 2024</a:t>
             </a:fld>
             <a:endParaRPr lang="en-US" dirty="0"/>
           </a:p>
@@ -28541,7 +28541,7 @@
           <a:p>
             <a:fld id="{5958763E-B898-436D-883D-03711491D54A}" type="datetimeFigureOut">
               <a:rPr lang="en-US" smtClean="0"/>
-              <a:t>9/6/2022</a:t>
+              <a:t>4/1/2024</a:t>
             </a:fld>
             <a:endParaRPr lang="en-US"/>
           </a:p>
@@ -28943,7 +28943,7 @@
           <a:p>
             <a:fld id="{5958763E-B898-436D-883D-03711491D54A}" type="datetimeFigureOut">
               <a:rPr lang="en-US" smtClean="0"/>
-              <a:t>9/6/2022</a:t>
+              <a:t>4/1/2024</a:t>
             </a:fld>
             <a:endParaRPr lang="en-US"/>
           </a:p>
@@ -29237,7 +29237,7 @@
           <a:p>
             <a:fld id="{5958763E-B898-436D-883D-03711491D54A}" type="datetimeFigureOut">
               <a:rPr lang="en-US" smtClean="0"/>
-              <a:t>9/6/2022</a:t>
+              <a:t>4/1/2024</a:t>
             </a:fld>
             <a:endParaRPr lang="en-US"/>
           </a:p>
@@ -29438,7 +29438,7 @@
           <a:p>
             <a:fld id="{5958763E-B898-436D-883D-03711491D54A}" type="datetimeFigureOut">
               <a:rPr lang="en-US" smtClean="0"/>
-              <a:t>9/6/2022</a:t>
+              <a:t>4/1/2024</a:t>
             </a:fld>
             <a:endParaRPr lang="en-US"/>
           </a:p>
@@ -29699,7 +29699,7 @@
           <a:p>
             <a:fld id="{5958763E-B898-436D-883D-03711491D54A}" type="datetimeFigureOut">
               <a:rPr lang="en-US" smtClean="0"/>
-              <a:t>9/6/2022</a:t>
+              <a:t>4/1/2024</a:t>
             </a:fld>
             <a:endParaRPr lang="en-US"/>
           </a:p>
@@ -30207,7 +30207,7 @@
           <a:p>
             <a:fld id="{5958763E-B898-436D-883D-03711491D54A}" type="datetimeFigureOut">
               <a:rPr lang="en-US" smtClean="0"/>
-              <a:t>9/6/2022</a:t>
+              <a:t>4/1/2024</a:t>
             </a:fld>
             <a:endParaRPr lang="en-US"/>
           </a:p>
@@ -30686,7 +30686,7 @@
           <a:p>
             <a:fld id="{5958763E-B898-436D-883D-03711491D54A}" type="datetimeFigureOut">
               <a:rPr lang="en-US" smtClean="0"/>
-              <a:t>9/6/2022</a:t>
+              <a:t>4/1/2024</a:t>
             </a:fld>
             <a:endParaRPr lang="en-US"/>
           </a:p>
@@ -31505,7 +31505,7 @@
           <a:p>
             <a:fld id="{5958763E-B898-436D-883D-03711491D54A}" type="datetimeFigureOut">
               <a:rPr lang="en-US" smtClean="0"/>
-              <a:t>9/6/2022</a:t>
+              <a:t>4/1/2024</a:t>
             </a:fld>
             <a:endParaRPr lang="en-US"/>
           </a:p>
@@ -31706,7 +31706,7 @@
           <a:p>
             <a:fld id="{5958763E-B898-436D-883D-03711491D54A}" type="datetimeFigureOut">
               <a:rPr lang="en-US" smtClean="0"/>
-              <a:t>9/6/2022</a:t>
+              <a:t>4/1/2024</a:t>
             </a:fld>
             <a:endParaRPr lang="en-US"/>
           </a:p>
@@ -32041,7 +32041,7 @@
           <a:p>
             <a:fld id="{5958763E-B898-436D-883D-03711491D54A}" type="datetimeFigureOut">
               <a:rPr lang="en-US" smtClean="0"/>
-              <a:t>9/6/2022</a:t>
+              <a:t>4/1/2024</a:t>
             </a:fld>
             <a:endParaRPr lang="en-US"/>
           </a:p>
@@ -32271,7 +32271,7 @@
           <a:p>
             <a:fld id="{5958763E-B898-436D-883D-03711491D54A}" type="datetimeFigureOut">
               <a:rPr lang="en-US" smtClean="0"/>
-              <a:t>9/6/2022</a:t>
+              <a:t>4/1/2024</a:t>
             </a:fld>
             <a:endParaRPr lang="en-US"/>
           </a:p>
@@ -32515,7 +32515,7 @@
           <a:p>
             <a:fld id="{5958763E-B898-436D-883D-03711491D54A}" type="datetimeFigureOut">
               <a:rPr lang="en-US" smtClean="0"/>
-              <a:t>9/6/2022</a:t>
+              <a:t>4/1/2024</a:t>
             </a:fld>
             <a:endParaRPr lang="en-US"/>
           </a:p>
@@ -38595,23 +38595,8 @@
                 </a:solidFill>
                 <a:latin typeface="Consolas" panose="020B0609020204030204" pitchFamily="49" charset="0"/>
               </a:rPr>
-              <a:t>#</a:t>
+              <a:t>#my-input</a:t>
             </a:r>
-            <a:r>
-              <a:rPr lang="en-US" sz="3200" i="1" dirty="0" err="1">
-                <a:solidFill>
-                  <a:srgbClr val="800000"/>
-                </a:solidFill>
-                <a:latin typeface="Consolas" panose="020B0609020204030204" pitchFamily="49" charset="0"/>
-              </a:rPr>
-              <a:t>myInput</a:t>
-            </a:r>
-            <a:endParaRPr lang="en-US" sz="3200" i="1" dirty="0">
-              <a:solidFill>
-                <a:srgbClr val="800000"/>
-              </a:solidFill>
-              <a:latin typeface="Consolas" panose="020B0609020204030204" pitchFamily="49" charset="0"/>
-            </a:endParaRPr>
           </a:p>
           <a:p>
             <a:pPr marL="57150" indent="0">

</xml_diff>

<commit_message>
Update gitbook 2024-04-01 20:18:45
</commit_message>
<xml_diff>
--- a/DomManipulation/DomManipulationIntro.pptx
+++ b/DomManipulation/DomManipulationIntro.pptx
@@ -218,7 +218,7 @@
           <a:p>
             <a:fld id="{19104133-B5B0-4351-8158-4F0E5EB1E2BF}" type="datetimeFigureOut">
               <a:rPr lang="en-US" smtClean="0"/>
-              <a:t>9/6/2022</a:t>
+              <a:t>4/1/2024</a:t>
             </a:fld>
             <a:endParaRPr lang="en-US"/>
           </a:p>
@@ -1449,7 +1449,7 @@
             <a:fld id="{1C2D31DE-C454-491C-B5C3-F097855E3DF7}" type="datetime4">
               <a:rPr lang="en-US" smtClean="0"/>
               <a:pPr/>
-              <a:t>September 6, 2022</a:t>
+              <a:t>April 1, 2024</a:t>
             </a:fld>
             <a:endParaRPr lang="en-US" dirty="0"/>
           </a:p>
@@ -4841,7 +4841,7 @@
           <a:p>
             <a:fld id="{5958763E-B898-436D-883D-03711491D54A}" type="datetimeFigureOut">
               <a:rPr lang="en-US" smtClean="0"/>
-              <a:t>9/6/2022</a:t>
+              <a:t>4/1/2024</a:t>
             </a:fld>
             <a:endParaRPr lang="en-US"/>
           </a:p>
@@ -5034,7 +5034,7 @@
           <a:p>
             <a:fld id="{5958763E-B898-436D-883D-03711491D54A}" type="datetimeFigureOut">
               <a:rPr lang="en-US" smtClean="0"/>
-              <a:t>9/6/2022</a:t>
+              <a:t>4/1/2024</a:t>
             </a:fld>
             <a:endParaRPr lang="en-US"/>
           </a:p>
@@ -5284,7 +5284,7 @@
           <a:p>
             <a:fld id="{5958763E-B898-436D-883D-03711491D54A}" type="datetimeFigureOut">
               <a:rPr lang="en-US" smtClean="0"/>
-              <a:t>9/6/2022</a:t>
+              <a:t>4/1/2024</a:t>
             </a:fld>
             <a:endParaRPr lang="en-US"/>
           </a:p>
@@ -5632,7 +5632,7 @@
           <a:p>
             <a:fld id="{5958763E-B898-436D-883D-03711491D54A}" type="datetimeFigureOut">
               <a:rPr lang="en-US" smtClean="0"/>
-              <a:t>9/6/2022</a:t>
+              <a:t>4/1/2024</a:t>
             </a:fld>
             <a:endParaRPr lang="en-US"/>
           </a:p>
@@ -6048,7 +6048,7 @@
           <a:p>
             <a:fld id="{5958763E-B898-436D-883D-03711491D54A}" type="datetimeFigureOut">
               <a:rPr lang="en-US" smtClean="0"/>
-              <a:t>9/6/2022</a:t>
+              <a:t>4/1/2024</a:t>
             </a:fld>
             <a:endParaRPr lang="en-US"/>
           </a:p>
@@ -6549,7 +6549,7 @@
           <a:p>
             <a:fld id="{5958763E-B898-436D-883D-03711491D54A}" type="datetimeFigureOut">
               <a:rPr lang="en-US" smtClean="0"/>
-              <a:t>9/6/2022</a:t>
+              <a:t>4/1/2024</a:t>
             </a:fld>
             <a:endParaRPr lang="en-US"/>
           </a:p>
@@ -7000,7 +7000,7 @@
           <a:p>
             <a:fld id="{5958763E-B898-436D-883D-03711491D54A}" type="datetimeFigureOut">
               <a:rPr lang="en-US" smtClean="0"/>
-              <a:t>9/6/2022</a:t>
+              <a:t>4/1/2024</a:t>
             </a:fld>
             <a:endParaRPr lang="en-US"/>
           </a:p>
@@ -7611,7 +7611,7 @@
           <a:p>
             <a:fld id="{5958763E-B898-436D-883D-03711491D54A}" type="datetimeFigureOut">
               <a:rPr lang="en-US" smtClean="0"/>
-              <a:t>9/6/2022</a:t>
+              <a:t>4/1/2024</a:t>
             </a:fld>
             <a:endParaRPr lang="en-US"/>
           </a:p>
@@ -8382,7 +8382,7 @@
           <a:p>
             <a:fld id="{5958763E-B898-436D-883D-03711491D54A}" type="datetimeFigureOut">
               <a:rPr lang="en-US" smtClean="0"/>
-              <a:t>9/6/2022</a:t>
+              <a:t>4/1/2024</a:t>
             </a:fld>
             <a:endParaRPr lang="en-US"/>
           </a:p>
@@ -8486,7 +8486,7 @@
           <a:p>
             <a:fld id="{5958763E-B898-436D-883D-03711491D54A}" type="datetimeFigureOut">
               <a:rPr lang="en-US" smtClean="0"/>
-              <a:t>9/6/2022</a:t>
+              <a:t>4/1/2024</a:t>
             </a:fld>
             <a:endParaRPr lang="en-US"/>
           </a:p>
@@ -8813,7 +8813,7 @@
             <a:fld id="{1C2D31DE-C454-491C-B5C3-F097855E3DF7}" type="datetime4">
               <a:rPr lang="en-US" smtClean="0"/>
               <a:pPr/>
-              <a:t>September 6, 2022</a:t>
+              <a:t>April 1, 2024</a:t>
             </a:fld>
             <a:endParaRPr lang="en-US" dirty="0"/>
           </a:p>
@@ -11965,7 +11965,7 @@
           <a:p>
             <a:fld id="{5958763E-B898-436D-883D-03711491D54A}" type="datetimeFigureOut">
               <a:rPr lang="en-US" smtClean="0"/>
-              <a:t>9/6/2022</a:t>
+              <a:t>4/1/2024</a:t>
             </a:fld>
             <a:endParaRPr lang="en-US"/>
           </a:p>
@@ -12089,7 +12089,7 @@
           <a:p>
             <a:fld id="{5958763E-B898-436D-883D-03711491D54A}" type="datetimeFigureOut">
               <a:rPr lang="en-US" smtClean="0"/>
-              <a:t>9/6/2022</a:t>
+              <a:t>4/1/2024</a:t>
             </a:fld>
             <a:endParaRPr lang="en-US"/>
           </a:p>
@@ -12213,7 +12213,7 @@
           <a:p>
             <a:fld id="{5958763E-B898-436D-883D-03711491D54A}" type="datetimeFigureOut">
               <a:rPr lang="en-US" smtClean="0"/>
-              <a:t>9/6/2022</a:t>
+              <a:t>4/1/2024</a:t>
             </a:fld>
             <a:endParaRPr lang="en-US"/>
           </a:p>
@@ -12337,7 +12337,7 @@
           <a:p>
             <a:fld id="{5958763E-B898-436D-883D-03711491D54A}" type="datetimeFigureOut">
               <a:rPr lang="en-US" smtClean="0"/>
-              <a:t>9/6/2022</a:t>
+              <a:t>4/1/2024</a:t>
             </a:fld>
             <a:endParaRPr lang="en-US"/>
           </a:p>
@@ -12461,7 +12461,7 @@
           <a:p>
             <a:fld id="{5958763E-B898-436D-883D-03711491D54A}" type="datetimeFigureOut">
               <a:rPr lang="en-US" smtClean="0"/>
-              <a:t>9/6/2022</a:t>
+              <a:t>4/1/2024</a:t>
             </a:fld>
             <a:endParaRPr lang="en-US"/>
           </a:p>
@@ -12585,7 +12585,7 @@
           <a:p>
             <a:fld id="{5958763E-B898-436D-883D-03711491D54A}" type="datetimeFigureOut">
               <a:rPr lang="en-US" smtClean="0"/>
-              <a:t>9/6/2022</a:t>
+              <a:t>4/1/2024</a:t>
             </a:fld>
             <a:endParaRPr lang="en-US"/>
           </a:p>
@@ -12709,7 +12709,7 @@
           <a:p>
             <a:fld id="{5958763E-B898-436D-883D-03711491D54A}" type="datetimeFigureOut">
               <a:rPr lang="en-US" smtClean="0"/>
-              <a:t>9/6/2022</a:t>
+              <a:t>4/1/2024</a:t>
             </a:fld>
             <a:endParaRPr lang="en-US"/>
           </a:p>
@@ -12833,7 +12833,7 @@
           <a:p>
             <a:fld id="{5958763E-B898-436D-883D-03711491D54A}" type="datetimeFigureOut">
               <a:rPr lang="en-US" smtClean="0"/>
-              <a:t>9/6/2022</a:t>
+              <a:t>4/1/2024</a:t>
             </a:fld>
             <a:endParaRPr lang="en-US"/>
           </a:p>
@@ -12966,7 +12966,7 @@
           <a:p>
             <a:fld id="{5958763E-B898-436D-883D-03711491D54A}" type="datetimeFigureOut">
               <a:rPr lang="en-US" smtClean="0"/>
-              <a:t>9/6/2022</a:t>
+              <a:t>4/1/2024</a:t>
             </a:fld>
             <a:endParaRPr lang="en-US"/>
           </a:p>
@@ -16305,7 +16305,7 @@
             <a:fld id="{1C2D31DE-C454-491C-B5C3-F097855E3DF7}" type="datetime4">
               <a:rPr lang="en-US" smtClean="0"/>
               <a:pPr/>
-              <a:t>September 6, 2022</a:t>
+              <a:t>April 1, 2024</a:t>
             </a:fld>
             <a:endParaRPr lang="en-US" dirty="0"/>
           </a:p>
@@ -28541,7 +28541,7 @@
           <a:p>
             <a:fld id="{5958763E-B898-436D-883D-03711491D54A}" type="datetimeFigureOut">
               <a:rPr lang="en-US" smtClean="0"/>
-              <a:t>9/6/2022</a:t>
+              <a:t>4/1/2024</a:t>
             </a:fld>
             <a:endParaRPr lang="en-US"/>
           </a:p>
@@ -28943,7 +28943,7 @@
           <a:p>
             <a:fld id="{5958763E-B898-436D-883D-03711491D54A}" type="datetimeFigureOut">
               <a:rPr lang="en-US" smtClean="0"/>
-              <a:t>9/6/2022</a:t>
+              <a:t>4/1/2024</a:t>
             </a:fld>
             <a:endParaRPr lang="en-US"/>
           </a:p>
@@ -29237,7 +29237,7 @@
           <a:p>
             <a:fld id="{5958763E-B898-436D-883D-03711491D54A}" type="datetimeFigureOut">
               <a:rPr lang="en-US" smtClean="0"/>
-              <a:t>9/6/2022</a:t>
+              <a:t>4/1/2024</a:t>
             </a:fld>
             <a:endParaRPr lang="en-US"/>
           </a:p>
@@ -29438,7 +29438,7 @@
           <a:p>
             <a:fld id="{5958763E-B898-436D-883D-03711491D54A}" type="datetimeFigureOut">
               <a:rPr lang="en-US" smtClean="0"/>
-              <a:t>9/6/2022</a:t>
+              <a:t>4/1/2024</a:t>
             </a:fld>
             <a:endParaRPr lang="en-US"/>
           </a:p>
@@ -29699,7 +29699,7 @@
           <a:p>
             <a:fld id="{5958763E-B898-436D-883D-03711491D54A}" type="datetimeFigureOut">
               <a:rPr lang="en-US" smtClean="0"/>
-              <a:t>9/6/2022</a:t>
+              <a:t>4/1/2024</a:t>
             </a:fld>
             <a:endParaRPr lang="en-US"/>
           </a:p>
@@ -30207,7 +30207,7 @@
           <a:p>
             <a:fld id="{5958763E-B898-436D-883D-03711491D54A}" type="datetimeFigureOut">
               <a:rPr lang="en-US" smtClean="0"/>
-              <a:t>9/6/2022</a:t>
+              <a:t>4/1/2024</a:t>
             </a:fld>
             <a:endParaRPr lang="en-US"/>
           </a:p>
@@ -30686,7 +30686,7 @@
           <a:p>
             <a:fld id="{5958763E-B898-436D-883D-03711491D54A}" type="datetimeFigureOut">
               <a:rPr lang="en-US" smtClean="0"/>
-              <a:t>9/6/2022</a:t>
+              <a:t>4/1/2024</a:t>
             </a:fld>
             <a:endParaRPr lang="en-US"/>
           </a:p>
@@ -31505,7 +31505,7 @@
           <a:p>
             <a:fld id="{5958763E-B898-436D-883D-03711491D54A}" type="datetimeFigureOut">
               <a:rPr lang="en-US" smtClean="0"/>
-              <a:t>9/6/2022</a:t>
+              <a:t>4/1/2024</a:t>
             </a:fld>
             <a:endParaRPr lang="en-US"/>
           </a:p>
@@ -31706,7 +31706,7 @@
           <a:p>
             <a:fld id="{5958763E-B898-436D-883D-03711491D54A}" type="datetimeFigureOut">
               <a:rPr lang="en-US" smtClean="0"/>
-              <a:t>9/6/2022</a:t>
+              <a:t>4/1/2024</a:t>
             </a:fld>
             <a:endParaRPr lang="en-US"/>
           </a:p>
@@ -32041,7 +32041,7 @@
           <a:p>
             <a:fld id="{5958763E-B898-436D-883D-03711491D54A}" type="datetimeFigureOut">
               <a:rPr lang="en-US" smtClean="0"/>
-              <a:t>9/6/2022</a:t>
+              <a:t>4/1/2024</a:t>
             </a:fld>
             <a:endParaRPr lang="en-US"/>
           </a:p>
@@ -32271,7 +32271,7 @@
           <a:p>
             <a:fld id="{5958763E-B898-436D-883D-03711491D54A}" type="datetimeFigureOut">
               <a:rPr lang="en-US" smtClean="0"/>
-              <a:t>9/6/2022</a:t>
+              <a:t>4/1/2024</a:t>
             </a:fld>
             <a:endParaRPr lang="en-US"/>
           </a:p>
@@ -32515,7 +32515,7 @@
           <a:p>
             <a:fld id="{5958763E-B898-436D-883D-03711491D54A}" type="datetimeFigureOut">
               <a:rPr lang="en-US" smtClean="0"/>
-              <a:t>9/6/2022</a:t>
+              <a:t>4/1/2024</a:t>
             </a:fld>
             <a:endParaRPr lang="en-US"/>
           </a:p>
@@ -38595,23 +38595,8 @@
                 </a:solidFill>
                 <a:latin typeface="Consolas" panose="020B0609020204030204" pitchFamily="49" charset="0"/>
               </a:rPr>
-              <a:t>#</a:t>
+              <a:t>#my-input</a:t>
             </a:r>
-            <a:r>
-              <a:rPr lang="en-US" sz="3200" i="1" dirty="0" err="1">
-                <a:solidFill>
-                  <a:srgbClr val="800000"/>
-                </a:solidFill>
-                <a:latin typeface="Consolas" panose="020B0609020204030204" pitchFamily="49" charset="0"/>
-              </a:rPr>
-              <a:t>myInput</a:t>
-            </a:r>
-            <a:endParaRPr lang="en-US" sz="3200" i="1" dirty="0">
-              <a:solidFill>
-                <a:srgbClr val="800000"/>
-              </a:solidFill>
-              <a:latin typeface="Consolas" panose="020B0609020204030204" pitchFamily="49" charset="0"/>
-            </a:endParaRPr>
           </a:p>
           <a:p>
             <a:pPr marL="57150" indent="0">

</xml_diff>